<commit_message>
Live Lecture 26 updates
</commit_message>
<xml_diff>
--- a/lectures/lecture-26/Lecture-Live/Lecture 26 - Lecture.pptx
+++ b/lectures/lecture-26/Lecture-Live/Lecture 26 - Lecture.pptx
@@ -4123,7 +4123,7 @@
         </p:spPr>
         <p:txBody>
           <a:bodyPr>
-            <a:normAutofit/>
+            <a:normAutofit lnSpcReduction="10000"/>
           </a:bodyPr>
           <a:lstStyle/>
           <a:p>
@@ -4181,6 +4181,31 @@
             <a:r>
               <a:rPr lang="en-US" dirty="0" err="1"/>
               <a:t>11:59pm</a:t>
+            </a:r>
+            <a:endParaRPr lang="en-US" dirty="0"/>
+          </a:p>
+          <a:p>
+            <a:r>
+              <a:rPr lang="en-US" dirty="0"/>
+              <a:t>Friday</a:t>
+            </a:r>
+          </a:p>
+          <a:p>
+            <a:pPr lvl="1"/>
+            <a:r>
+              <a:rPr lang="en-US" dirty="0"/>
+              <a:t>No pre-lecture</a:t>
+            </a:r>
+          </a:p>
+          <a:p>
+            <a:pPr lvl="1"/>
+            <a:r>
+              <a:rPr lang="en-US" dirty="0"/>
+              <a:t>Review – </a:t>
+            </a:r>
+            <a:r>
+              <a:rPr lang="en-US"/>
+              <a:t>bring your questions</a:t>
             </a:r>
             <a:endParaRPr lang="en-US" dirty="0"/>
           </a:p>

</xml_diff>